<commit_message>
Improve figure and add activity
</commit_message>
<xml_diff>
--- a/figures/resources/volume_rendering.pptx
+++ b/figures/resources/volume_rendering.pptx
@@ -105,6 +105,11 @@
       </a:defRPr>
     </a:lvl9pPr>
   </p:defaultTextStyle>
+  <p:extLst>
+    <p:ext uri="{EFAFB233-063F-42B5-8137-9DF3F51BA10A}">
+      <p15:sldGuideLst xmlns:p15="http://schemas.microsoft.com/office/powerpoint/2012/main"/>
+    </p:ext>
+  </p:extLst>
 </p:presentation>
 </file>
 
@@ -3590,13 +3595,13 @@
         </p:nvPicPr>
         <p:blipFill rotWithShape="1">
           <a:blip r:embed="rId2"/>
-          <a:srcRect l="6617" t="14336" r="10253" b="6282"/>
+          <a:srcRect l="13859" t="22602" r="15896" b="6282"/>
           <a:stretch/>
         </p:blipFill>
         <p:spPr>
           <a:xfrm>
-            <a:off x="1778000" y="1320799"/>
-            <a:ext cx="3386667" cy="3606801"/>
+            <a:off x="270937" y="1608667"/>
+            <a:ext cx="2861733" cy="3231251"/>
           </a:xfrm>
           <a:prstGeom prst="rect">
             <a:avLst/>
@@ -3609,10 +3614,40 @@
       </p:pic>
       <p:pic>
         <p:nvPicPr>
-          <p:cNvPr id="6" name="Picture 10">
-            <a:extLst>
-              <a:ext uri="{FF2B5EF4-FFF2-40B4-BE49-F238E27FC236}">
-                <a16:creationId xmlns:a16="http://schemas.microsoft.com/office/drawing/2014/main" id="{BA28E405-521B-2744-BA34-D134EB8F8F55}"/>
+          <p:cNvPr id="5" name="Picture 4">
+            <a:extLst>
+              <a:ext uri="{FF2B5EF4-FFF2-40B4-BE49-F238E27FC236}">
+                <a16:creationId xmlns:a16="http://schemas.microsoft.com/office/drawing/2014/main" id="{B4608EEC-713E-7C44-B469-63DE5AABA0C9}"/>
+              </a:ext>
+            </a:extLst>
+          </p:cNvPr>
+          <p:cNvPicPr>
+            <a:picLocks noChangeAspect="1"/>
+          </p:cNvPicPr>
+          <p:nvPr/>
+        </p:nvPicPr>
+        <p:blipFill>
+          <a:blip r:embed="rId3"/>
+          <a:stretch>
+            <a:fillRect/>
+          </a:stretch>
+        </p:blipFill>
+        <p:spPr>
+          <a:xfrm>
+            <a:off x="3253229" y="1608667"/>
+            <a:ext cx="2715540" cy="3231251"/>
+          </a:xfrm>
+          <a:prstGeom prst="rect">
+            <a:avLst/>
+          </a:prstGeom>
+        </p:spPr>
+      </p:pic>
+      <p:pic>
+        <p:nvPicPr>
+          <p:cNvPr id="7" name="Picture 6">
+            <a:extLst>
+              <a:ext uri="{FF2B5EF4-FFF2-40B4-BE49-F238E27FC236}">
+                <a16:creationId xmlns:a16="http://schemas.microsoft.com/office/drawing/2014/main" id="{E2379BD8-B7D5-9649-B491-613CE2BB8842}"/>
               </a:ext>
             </a:extLst>
           </p:cNvPr>
@@ -3622,22 +3657,48 @@
           <p:nvPr/>
         </p:nvPicPr>
         <p:blipFill rotWithShape="1">
-          <a:blip r:embed="rId3"/>
-          <a:srcRect l="14402" t="8727" r="15647" b="4723"/>
+          <a:blip r:embed="rId4"/>
+          <a:srcRect b="5147"/>
           <a:stretch/>
         </p:blipFill>
         <p:spPr>
           <a:xfrm>
-            <a:off x="5350933" y="1320799"/>
-            <a:ext cx="3276296" cy="3606801"/>
+            <a:off x="6072397" y="1608667"/>
+            <a:ext cx="2665203" cy="3252612"/>
           </a:xfrm>
           <a:prstGeom prst="rect">
             <a:avLst/>
           </a:prstGeom>
-          <a:noFill/>
-          <a:ln cap="flat">
-            <a:noFill/>
-          </a:ln>
+        </p:spPr>
+      </p:pic>
+      <p:pic>
+        <p:nvPicPr>
+          <p:cNvPr id="8" name="Picture 7">
+            <a:extLst>
+              <a:ext uri="{FF2B5EF4-FFF2-40B4-BE49-F238E27FC236}">
+                <a16:creationId xmlns:a16="http://schemas.microsoft.com/office/drawing/2014/main" id="{EA3102B5-8642-1D44-BADB-ED8674D3E552}"/>
+              </a:ext>
+            </a:extLst>
+          </p:cNvPr>
+          <p:cNvPicPr>
+            <a:picLocks noChangeAspect="1"/>
+          </p:cNvPicPr>
+          <p:nvPr/>
+        </p:nvPicPr>
+        <p:blipFill>
+          <a:blip r:embed="rId5"/>
+          <a:stretch>
+            <a:fillRect/>
+          </a:stretch>
+        </p:blipFill>
+        <p:spPr>
+          <a:xfrm>
+            <a:off x="8839201" y="1608668"/>
+            <a:ext cx="2608694" cy="3252612"/>
+          </a:xfrm>
+          <a:prstGeom prst="rect">
+            <a:avLst/>
+          </a:prstGeom>
         </p:spPr>
       </p:pic>
     </p:spTree>

</xml_diff>

<commit_message>
Improve module and add more data
</commit_message>
<xml_diff>
--- a/figures/resources/volume_rendering.pptx
+++ b/figures/resources/volume_rendering.pptx
@@ -3600,8 +3600,8 @@
         </p:blipFill>
         <p:spPr>
           <a:xfrm>
-            <a:off x="270937" y="1608667"/>
-            <a:ext cx="2861733" cy="3231251"/>
+            <a:off x="168026" y="321734"/>
+            <a:ext cx="2429494" cy="2743200"/>
           </a:xfrm>
           <a:prstGeom prst="rect">
             <a:avLst/>
@@ -3634,8 +3634,8 @@
         </p:blipFill>
         <p:spPr>
           <a:xfrm>
-            <a:off x="3253229" y="1608667"/>
-            <a:ext cx="2715540" cy="3231251"/>
+            <a:off x="5069666" y="321733"/>
+            <a:ext cx="2305382" cy="2743200"/>
           </a:xfrm>
           <a:prstGeom prst="rect">
             <a:avLst/>
@@ -3663,8 +3663,8 @@
         </p:blipFill>
         <p:spPr>
           <a:xfrm>
-            <a:off x="6072397" y="1608667"/>
-            <a:ext cx="2665203" cy="3252612"/>
+            <a:off x="7450312" y="321733"/>
+            <a:ext cx="2247788" cy="2743200"/>
           </a:xfrm>
           <a:prstGeom prst="rect">
             <a:avLst/>
@@ -3693,8 +3693,195 @@
         </p:blipFill>
         <p:spPr>
           <a:xfrm>
-            <a:off x="8839201" y="1608668"/>
-            <a:ext cx="2608694" cy="3252612"/>
+            <a:off x="9773364" y="321733"/>
+            <a:ext cx="2200129" cy="2743200"/>
+          </a:xfrm>
+          <a:prstGeom prst="rect">
+            <a:avLst/>
+          </a:prstGeom>
+        </p:spPr>
+      </p:pic>
+      <p:pic>
+        <p:nvPicPr>
+          <p:cNvPr id="9" name="Picture 8">
+            <a:extLst>
+              <a:ext uri="{FF2B5EF4-FFF2-40B4-BE49-F238E27FC236}">
+                <a16:creationId xmlns:a16="http://schemas.microsoft.com/office/drawing/2014/main" id="{1F85AF83-A291-6B4A-8760-D4E894A25B56}"/>
+              </a:ext>
+            </a:extLst>
+          </p:cNvPr>
+          <p:cNvPicPr>
+            <a:picLocks noChangeAspect="1"/>
+          </p:cNvPicPr>
+          <p:nvPr/>
+        </p:nvPicPr>
+        <p:blipFill rotWithShape="1">
+          <a:blip r:embed="rId6"/>
+          <a:srcRect l="3330" r="13941" b="14011"/>
+          <a:stretch/>
+        </p:blipFill>
+        <p:spPr>
+          <a:xfrm>
+            <a:off x="2672785" y="321733"/>
+            <a:ext cx="2321616" cy="2743200"/>
+          </a:xfrm>
+          <a:prstGeom prst="rect">
+            <a:avLst/>
+          </a:prstGeom>
+        </p:spPr>
+      </p:pic>
+      <p:sp>
+        <p:nvSpPr>
+          <p:cNvPr id="10" name="TextBox 9">
+            <a:extLst>
+              <a:ext uri="{FF2B5EF4-FFF2-40B4-BE49-F238E27FC236}">
+                <a16:creationId xmlns:a16="http://schemas.microsoft.com/office/drawing/2014/main" id="{C6D8B5EE-53C1-4344-B28B-2DEE5F9D013D}"/>
+              </a:ext>
+            </a:extLst>
+          </p:cNvPr>
+          <p:cNvSpPr txBox="1"/>
+          <p:nvPr/>
+        </p:nvSpPr>
+        <p:spPr>
+          <a:xfrm>
+            <a:off x="965200" y="-795867"/>
+            <a:ext cx="5002331" cy="646331"/>
+          </a:xfrm>
+          <a:prstGeom prst="rect">
+            <a:avLst/>
+          </a:prstGeom>
+          <a:noFill/>
+        </p:spPr>
+        <p:txBody>
+          <a:bodyPr wrap="none" rtlCol="0">
+            <a:spAutoFit/>
+          </a:bodyPr>
+          <a:lstStyle/>
+          <a:p>
+            <a:r>
+              <a:rPr lang="de-DE" dirty="0" err="1"/>
+              <a:t>Image_data</a:t>
+            </a:r>
+            <a:r>
+              <a:rPr lang="de-DE" dirty="0"/>
+              <a:t>/xyz_8bit_calibrated__mri_full_head.tif</a:t>
+            </a:r>
+          </a:p>
+          <a:p>
+            <a:endParaRPr lang="de-DE" dirty="0"/>
+          </a:p>
+        </p:txBody>
+      </p:sp>
+      <p:pic>
+        <p:nvPicPr>
+          <p:cNvPr id="11" name="Picture 10">
+            <a:extLst>
+              <a:ext uri="{FF2B5EF4-FFF2-40B4-BE49-F238E27FC236}">
+                <a16:creationId xmlns:a16="http://schemas.microsoft.com/office/drawing/2014/main" id="{AF7DDB1B-B171-8941-8F96-DC218C0C0862}"/>
+              </a:ext>
+            </a:extLst>
+          </p:cNvPr>
+          <p:cNvPicPr>
+            <a:picLocks noChangeAspect="1"/>
+          </p:cNvPicPr>
+          <p:nvPr/>
+        </p:nvPicPr>
+        <p:blipFill rotWithShape="1">
+          <a:blip r:embed="rId7"/>
+          <a:srcRect r="45526"/>
+          <a:stretch/>
+        </p:blipFill>
+        <p:spPr>
+          <a:xfrm>
+            <a:off x="168026" y="3383802"/>
+            <a:ext cx="2641602" cy="2517431"/>
+          </a:xfrm>
+          <a:prstGeom prst="rect">
+            <a:avLst/>
+          </a:prstGeom>
+        </p:spPr>
+      </p:pic>
+      <p:pic>
+        <p:nvPicPr>
+          <p:cNvPr id="12" name="Picture 11">
+            <a:extLst>
+              <a:ext uri="{FF2B5EF4-FFF2-40B4-BE49-F238E27FC236}">
+                <a16:creationId xmlns:a16="http://schemas.microsoft.com/office/drawing/2014/main" id="{BF048682-3B40-4F42-9AE2-6E6EF8A65BF9}"/>
+              </a:ext>
+            </a:extLst>
+          </p:cNvPr>
+          <p:cNvPicPr>
+            <a:picLocks noChangeAspect="1"/>
+          </p:cNvPicPr>
+          <p:nvPr/>
+        </p:nvPicPr>
+        <p:blipFill rotWithShape="1">
+          <a:blip r:embed="rId8"/>
+          <a:srcRect r="46096"/>
+          <a:stretch/>
+        </p:blipFill>
+        <p:spPr>
+          <a:xfrm>
+            <a:off x="3833593" y="3383802"/>
+            <a:ext cx="2616398" cy="2521361"/>
+          </a:xfrm>
+          <a:prstGeom prst="rect">
+            <a:avLst/>
+          </a:prstGeom>
+        </p:spPr>
+      </p:pic>
+      <p:pic>
+        <p:nvPicPr>
+          <p:cNvPr id="13" name="Picture 12">
+            <a:extLst>
+              <a:ext uri="{FF2B5EF4-FFF2-40B4-BE49-F238E27FC236}">
+                <a16:creationId xmlns:a16="http://schemas.microsoft.com/office/drawing/2014/main" id="{0B7134ED-3A90-894F-A423-169E103D6B7C}"/>
+              </a:ext>
+            </a:extLst>
+          </p:cNvPr>
+          <p:cNvPicPr>
+            <a:picLocks noChangeAspect="1"/>
+          </p:cNvPicPr>
+          <p:nvPr/>
+        </p:nvPicPr>
+        <p:blipFill rotWithShape="1">
+          <a:blip r:embed="rId9"/>
+          <a:srcRect l="4739" t="1637"/>
+          <a:stretch/>
+        </p:blipFill>
+        <p:spPr>
+          <a:xfrm>
+            <a:off x="5740400" y="4927600"/>
+            <a:ext cx="1290994" cy="1397608"/>
+          </a:xfrm>
+          <a:prstGeom prst="rect">
+            <a:avLst/>
+          </a:prstGeom>
+        </p:spPr>
+      </p:pic>
+      <p:pic>
+        <p:nvPicPr>
+          <p:cNvPr id="14" name="Picture 13">
+            <a:extLst>
+              <a:ext uri="{FF2B5EF4-FFF2-40B4-BE49-F238E27FC236}">
+                <a16:creationId xmlns:a16="http://schemas.microsoft.com/office/drawing/2014/main" id="{BD16BAA3-9316-3C4B-86CD-2695A9ABE03E}"/>
+              </a:ext>
+            </a:extLst>
+          </p:cNvPr>
+          <p:cNvPicPr>
+            <a:picLocks noChangeAspect="1"/>
+          </p:cNvPicPr>
+          <p:nvPr/>
+        </p:nvPicPr>
+        <p:blipFill rotWithShape="1">
+          <a:blip r:embed="rId10"/>
+          <a:srcRect l="4297" t="3006"/>
+          <a:stretch/>
+        </p:blipFill>
+        <p:spPr>
+          <a:xfrm>
+            <a:off x="2319867" y="4910667"/>
+            <a:ext cx="1261086" cy="1414541"/>
           </a:xfrm>
           <a:prstGeom prst="rect">
             <a:avLst/>

</xml_diff>